<commit_message>
put timeline slide before demo
</commit_message>
<xml_diff>
--- a/Midterm Presentation.pptx
+++ b/Midterm Presentation.pptx
@@ -11,8 +11,8 @@
     <p:sldId id="257" r:id="rId2"/>
     <p:sldId id="261" r:id="rId3"/>
     <p:sldId id="258" r:id="rId4"/>
-    <p:sldId id="262" r:id="rId5"/>
-    <p:sldId id="259" r:id="rId6"/>
+    <p:sldId id="259" r:id="rId5"/>
+    <p:sldId id="262" r:id="rId6"/>
     <p:sldId id="263" r:id="rId7"/>
     <p:sldId id="264" r:id="rId8"/>
     <p:sldId id="260" r:id="rId9"/>
@@ -122,8 +122,8 @@
             <p14:sldId id="257"/>
             <p14:sldId id="261"/>
             <p14:sldId id="258"/>
+            <p14:sldId id="259"/>
             <p14:sldId id="262"/>
-            <p14:sldId id="259"/>
             <p14:sldId id="263"/>
             <p14:sldId id="264"/>
             <p14:sldId id="260"/>
@@ -220,7 +220,7 @@
           <a:p>
             <a:fld id="{1D2D40E1-7C75-4435-8144-527545F291AA}" type="datetimeFigureOut">
               <a:rPr lang="en-US" smtClean="0"/>
-              <a:t>11/5/2018</a:t>
+              <a:t>11/8/2018</a:t>
             </a:fld>
             <a:endParaRPr lang="en-US"/>
           </a:p>
@@ -816,7 +816,7 @@
           <a:p>
             <a:fld id="{21959F96-BA19-40BE-9147-67669C98F192}" type="slidenum">
               <a:rPr lang="en-US" smtClean="0"/>
-              <a:t>5</a:t>
+              <a:t>4</a:t>
             </a:fld>
             <a:endParaRPr lang="en-US"/>
           </a:p>
@@ -1284,7 +1284,7 @@
           <a:p>
             <a:fld id="{C4FE5F31-8592-42D5-A4A7-735376C81CF5}" type="datetimeFigureOut">
               <a:rPr lang="en-US" smtClean="0"/>
-              <a:t>11/5/2018</a:t>
+              <a:t>11/8/2018</a:t>
             </a:fld>
             <a:endParaRPr lang="en-US"/>
           </a:p>
@@ -1720,7 +1720,7 @@
           <a:p>
             <a:fld id="{C4FE5F31-8592-42D5-A4A7-735376C81CF5}" type="datetimeFigureOut">
               <a:rPr lang="en-US" smtClean="0"/>
-              <a:t>11/5/2018</a:t>
+              <a:t>11/8/2018</a:t>
             </a:fld>
             <a:endParaRPr lang="en-US"/>
           </a:p>
@@ -1970,7 +1970,7 @@
           <a:p>
             <a:fld id="{C4FE5F31-8592-42D5-A4A7-735376C81CF5}" type="datetimeFigureOut">
               <a:rPr lang="en-US" smtClean="0"/>
-              <a:t>11/5/2018</a:t>
+              <a:t>11/8/2018</a:t>
             </a:fld>
             <a:endParaRPr lang="en-US"/>
           </a:p>
@@ -2278,7 +2278,7 @@
           <a:p>
             <a:fld id="{C4FE5F31-8592-42D5-A4A7-735376C81CF5}" type="datetimeFigureOut">
               <a:rPr lang="en-US" smtClean="0"/>
-              <a:t>11/5/2018</a:t>
+              <a:t>11/8/2018</a:t>
             </a:fld>
             <a:endParaRPr lang="en-US"/>
           </a:p>
@@ -2596,7 +2596,7 @@
           <a:p>
             <a:fld id="{C4FE5F31-8592-42D5-A4A7-735376C81CF5}" type="datetimeFigureOut">
               <a:rPr lang="en-US" smtClean="0"/>
-              <a:t>11/5/2018</a:t>
+              <a:t>11/8/2018</a:t>
             </a:fld>
             <a:endParaRPr lang="en-US"/>
           </a:p>
@@ -2898,7 +2898,7 @@
           <a:p>
             <a:fld id="{C4FE5F31-8592-42D5-A4A7-735376C81CF5}" type="datetimeFigureOut">
               <a:rPr lang="en-US" smtClean="0"/>
-              <a:t>11/5/2018</a:t>
+              <a:t>11/8/2018</a:t>
             </a:fld>
             <a:endParaRPr lang="en-US"/>
           </a:p>
@@ -3265,7 +3265,7 @@
           <a:p>
             <a:fld id="{C4FE5F31-8592-42D5-A4A7-735376C81CF5}" type="datetimeFigureOut">
               <a:rPr lang="en-US" smtClean="0"/>
-              <a:t>11/5/2018</a:t>
+              <a:t>11/8/2018</a:t>
             </a:fld>
             <a:endParaRPr lang="en-US"/>
           </a:p>
@@ -3439,7 +3439,7 @@
           <a:p>
             <a:fld id="{C4FE5F31-8592-42D5-A4A7-735376C81CF5}" type="datetimeFigureOut">
               <a:rPr lang="en-US" smtClean="0"/>
-              <a:t>11/5/2018</a:t>
+              <a:t>11/8/2018</a:t>
             </a:fld>
             <a:endParaRPr lang="en-US"/>
           </a:p>
@@ -3619,7 +3619,7 @@
           <a:p>
             <a:fld id="{C4FE5F31-8592-42D5-A4A7-735376C81CF5}" type="datetimeFigureOut">
               <a:rPr lang="en-US" smtClean="0"/>
-              <a:t>11/5/2018</a:t>
+              <a:t>11/8/2018</a:t>
             </a:fld>
             <a:endParaRPr lang="en-US"/>
           </a:p>
@@ -3789,7 +3789,7 @@
           <a:p>
             <a:fld id="{C4FE5F31-8592-42D5-A4A7-735376C81CF5}" type="datetimeFigureOut">
               <a:rPr lang="en-US" smtClean="0"/>
-              <a:t>11/5/2018</a:t>
+              <a:t>11/8/2018</a:t>
             </a:fld>
             <a:endParaRPr lang="en-US"/>
           </a:p>
@@ -4039,7 +4039,7 @@
           <a:p>
             <a:fld id="{C4FE5F31-8592-42D5-A4A7-735376C81CF5}" type="datetimeFigureOut">
               <a:rPr lang="en-US" smtClean="0"/>
-              <a:t>11/5/2018</a:t>
+              <a:t>11/8/2018</a:t>
             </a:fld>
             <a:endParaRPr lang="en-US"/>
           </a:p>
@@ -4275,7 +4275,7 @@
           <a:p>
             <a:fld id="{C4FE5F31-8592-42D5-A4A7-735376C81CF5}" type="datetimeFigureOut">
               <a:rPr lang="en-US" smtClean="0"/>
-              <a:t>11/5/2018</a:t>
+              <a:t>11/8/2018</a:t>
             </a:fld>
             <a:endParaRPr lang="en-US"/>
           </a:p>
@@ -4657,7 +4657,7 @@
           <a:p>
             <a:fld id="{C4FE5F31-8592-42D5-A4A7-735376C81CF5}" type="datetimeFigureOut">
               <a:rPr lang="en-US" smtClean="0"/>
-              <a:t>11/5/2018</a:t>
+              <a:t>11/8/2018</a:t>
             </a:fld>
             <a:endParaRPr lang="en-US"/>
           </a:p>
@@ -4775,7 +4775,7 @@
           <a:p>
             <a:fld id="{C4FE5F31-8592-42D5-A4A7-735376C81CF5}" type="datetimeFigureOut">
               <a:rPr lang="en-US" smtClean="0"/>
-              <a:t>11/5/2018</a:t>
+              <a:t>11/8/2018</a:t>
             </a:fld>
             <a:endParaRPr lang="en-US"/>
           </a:p>
@@ -4870,7 +4870,7 @@
           <a:p>
             <a:fld id="{C4FE5F31-8592-42D5-A4A7-735376C81CF5}" type="datetimeFigureOut">
               <a:rPr lang="en-US" smtClean="0"/>
-              <a:t>11/5/2018</a:t>
+              <a:t>11/8/2018</a:t>
             </a:fld>
             <a:endParaRPr lang="en-US"/>
           </a:p>
@@ -5125,7 +5125,7 @@
           <a:p>
             <a:fld id="{C4FE5F31-8592-42D5-A4A7-735376C81CF5}" type="datetimeFigureOut">
               <a:rPr lang="en-US" smtClean="0"/>
-              <a:t>11/5/2018</a:t>
+              <a:t>11/8/2018</a:t>
             </a:fld>
             <a:endParaRPr lang="en-US"/>
           </a:p>
@@ -5408,7 +5408,7 @@
           <a:p>
             <a:fld id="{C4FE5F31-8592-42D5-A4A7-735376C81CF5}" type="datetimeFigureOut">
               <a:rPr lang="en-US" smtClean="0"/>
-              <a:t>11/5/2018</a:t>
+              <a:t>11/8/2018</a:t>
             </a:fld>
             <a:endParaRPr lang="en-US"/>
           </a:p>
@@ -5814,7 +5814,7 @@
           <a:p>
             <a:fld id="{C4FE5F31-8592-42D5-A4A7-735376C81CF5}" type="datetimeFigureOut">
               <a:rPr lang="en-US" smtClean="0"/>
-              <a:t>11/5/2018</a:t>
+              <a:t>11/8/2018</a:t>
             </a:fld>
             <a:endParaRPr lang="en-US"/>
           </a:p>
@@ -6354,7 +6354,7 @@
           <p:cNvPr id="4" name="Title 3">
             <a:extLst>
               <a:ext uri="{FF2B5EF4-FFF2-40B4-BE49-F238E27FC236}">
-                <a16:creationId xmlns:a16="http://schemas.microsoft.com/office/drawing/2014/main" id="{BC1D564B-1870-4EFC-A1AF-BE47594B15F8}"/>
+                <a16:creationId xmlns:a16="http://schemas.microsoft.com/office/drawing/2014/main" xmlns="" id="{BC1D564B-1870-4EFC-A1AF-BE47594B15F8}"/>
               </a:ext>
             </a:extLst>
           </p:cNvPr>
@@ -6382,7 +6382,7 @@
           <p:cNvPr id="5" name="Subtitle 4">
             <a:extLst>
               <a:ext uri="{FF2B5EF4-FFF2-40B4-BE49-F238E27FC236}">
-                <a16:creationId xmlns:a16="http://schemas.microsoft.com/office/drawing/2014/main" id="{5AF370E5-7A3C-42D7-9C69-DD4DA95D6340}"/>
+                <a16:creationId xmlns:a16="http://schemas.microsoft.com/office/drawing/2014/main" xmlns="" id="{5AF370E5-7A3C-42D7-9C69-DD4DA95D6340}"/>
               </a:ext>
             </a:extLst>
           </p:cNvPr>
@@ -6410,7 +6410,7 @@
           <p:cNvPr id="6" name="Title 3">
             <a:extLst>
               <a:ext uri="{FF2B5EF4-FFF2-40B4-BE49-F238E27FC236}">
-                <a16:creationId xmlns:a16="http://schemas.microsoft.com/office/drawing/2014/main" id="{2E55C3D8-0239-4BA0-831D-A15485752A80}"/>
+                <a16:creationId xmlns:a16="http://schemas.microsoft.com/office/drawing/2014/main" xmlns="" id="{2E55C3D8-0239-4BA0-831D-A15485752A80}"/>
               </a:ext>
             </a:extLst>
           </p:cNvPr>
@@ -6638,7 +6638,7 @@
           <p:cNvPr id="2" name="Title 1">
             <a:extLst>
               <a:ext uri="{FF2B5EF4-FFF2-40B4-BE49-F238E27FC236}">
-                <a16:creationId xmlns:a16="http://schemas.microsoft.com/office/drawing/2014/main" id="{3DE0B584-EC5A-4B37-9082-E3900764815C}"/>
+                <a16:creationId xmlns:a16="http://schemas.microsoft.com/office/drawing/2014/main" xmlns="" id="{3DE0B584-EC5A-4B37-9082-E3900764815C}"/>
               </a:ext>
             </a:extLst>
           </p:cNvPr>
@@ -6668,7 +6668,7 @@
           <p:cNvPr id="3" name="Content Placeholder 2">
             <a:extLst>
               <a:ext uri="{FF2B5EF4-FFF2-40B4-BE49-F238E27FC236}">
-                <a16:creationId xmlns:a16="http://schemas.microsoft.com/office/drawing/2014/main" id="{5BDE2B2A-C53F-45D7-B68E-3C466D791074}"/>
+                <a16:creationId xmlns:a16="http://schemas.microsoft.com/office/drawing/2014/main" xmlns="" id="{5BDE2B2A-C53F-45D7-B68E-3C466D791074}"/>
               </a:ext>
             </a:extLst>
           </p:cNvPr>
@@ -6765,7 +6765,7 @@
           <p:cNvPr id="2" name="Title 1">
             <a:extLst>
               <a:ext uri="{FF2B5EF4-FFF2-40B4-BE49-F238E27FC236}">
-                <a16:creationId xmlns:a16="http://schemas.microsoft.com/office/drawing/2014/main" id="{33DC9F01-32B9-40CB-8100-DC1ECDC2DA7C}"/>
+                <a16:creationId xmlns:a16="http://schemas.microsoft.com/office/drawing/2014/main" xmlns="" id="{33DC9F01-32B9-40CB-8100-DC1ECDC2DA7C}"/>
               </a:ext>
             </a:extLst>
           </p:cNvPr>
@@ -6795,7 +6795,7 @@
           <p:cNvPr id="3" name="Content Placeholder 2">
             <a:extLst>
               <a:ext uri="{FF2B5EF4-FFF2-40B4-BE49-F238E27FC236}">
-                <a16:creationId xmlns:a16="http://schemas.microsoft.com/office/drawing/2014/main" id="{83440EFF-130E-46E8-BE5E-A39DC9910F60}"/>
+                <a16:creationId xmlns:a16="http://schemas.microsoft.com/office/drawing/2014/main" xmlns="" id="{83440EFF-130E-46E8-BE5E-A39DC9910F60}"/>
               </a:ext>
             </a:extLst>
           </p:cNvPr>
@@ -6847,70 +6847,10 @@
       </p:grpSpPr>
       <p:sp>
         <p:nvSpPr>
-          <p:cNvPr id="4" name="Title 3">
-            <a:extLst>
-              <a:ext uri="{FF2B5EF4-FFF2-40B4-BE49-F238E27FC236}">
-                <a16:creationId xmlns:a16="http://schemas.microsoft.com/office/drawing/2014/main" id="{B1E335D2-9597-4FC0-8ACA-9F196F2B7CD0}"/>
-              </a:ext>
-            </a:extLst>
-          </p:cNvPr>
-          <p:cNvSpPr>
-            <a:spLocks noGrp="1"/>
-          </p:cNvSpPr>
-          <p:nvPr>
-            <p:ph type="title"/>
-          </p:nvPr>
-        </p:nvSpPr>
-        <p:spPr/>
-        <p:txBody>
-          <a:bodyPr>
-            <a:normAutofit/>
-          </a:bodyPr>
-          <a:lstStyle/>
-          <a:p>
-            <a:r>
-              <a:rPr lang="en-US" sz="4400" dirty="0"/>
-              <a:t>Demo</a:t>
-            </a:r>
-          </a:p>
-        </p:txBody>
-      </p:sp>
-    </p:spTree>
-    <p:extLst>
-      <p:ext uri="{BB962C8B-B14F-4D97-AF65-F5344CB8AC3E}">
-        <p14:creationId xmlns:p14="http://schemas.microsoft.com/office/powerpoint/2010/main" val="1331305148"/>
-      </p:ext>
-    </p:extLst>
-  </p:cSld>
-  <p:clrMapOvr>
-    <a:masterClrMapping/>
-  </p:clrMapOvr>
-</p:sld>
-</file>
-
-<file path=ppt/slides/slide5.xml><?xml version="1.0" encoding="utf-8"?>
-<p:sld xmlns:a="http://schemas.openxmlformats.org/drawingml/2006/main" xmlns:r="http://schemas.openxmlformats.org/officeDocument/2006/relationships" xmlns:p="http://schemas.openxmlformats.org/presentationml/2006/main">
-  <p:cSld>
-    <p:spTree>
-      <p:nvGrpSpPr>
-        <p:cNvPr id="1" name=""/>
-        <p:cNvGrpSpPr/>
-        <p:nvPr/>
-      </p:nvGrpSpPr>
-      <p:grpSpPr>
-        <a:xfrm>
-          <a:off x="0" y="0"/>
-          <a:ext cx="0" cy="0"/>
-          <a:chOff x="0" y="0"/>
-          <a:chExt cx="0" cy="0"/>
-        </a:xfrm>
-      </p:grpSpPr>
-      <p:sp>
-        <p:nvSpPr>
           <p:cNvPr id="2" name="Title 1">
             <a:extLst>
               <a:ext uri="{FF2B5EF4-FFF2-40B4-BE49-F238E27FC236}">
-                <a16:creationId xmlns:a16="http://schemas.microsoft.com/office/drawing/2014/main" id="{15BAC696-E427-4944-B34F-4C100D7A6A88}"/>
+                <a16:creationId xmlns:a16="http://schemas.microsoft.com/office/drawing/2014/main" xmlns="" id="{15BAC696-E427-4944-B34F-4C100D7A6A88}"/>
               </a:ext>
             </a:extLst>
           </p:cNvPr>
@@ -6944,7 +6884,7 @@
           <p:cNvPr id="64" name="Group 63">
             <a:extLst>
               <a:ext uri="{FF2B5EF4-FFF2-40B4-BE49-F238E27FC236}">
-                <a16:creationId xmlns:a16="http://schemas.microsoft.com/office/drawing/2014/main" id="{4704C14E-21A1-418A-983E-18DAFF3D085A}"/>
+                <a16:creationId xmlns:a16="http://schemas.microsoft.com/office/drawing/2014/main" xmlns="" id="{4704C14E-21A1-418A-983E-18DAFF3D085A}"/>
               </a:ext>
             </a:extLst>
           </p:cNvPr>
@@ -6964,7 +6904,7 @@
             <p:cNvPr id="34" name="Freeform: Shape 33">
               <a:extLst>
                 <a:ext uri="{FF2B5EF4-FFF2-40B4-BE49-F238E27FC236}">
-                  <a16:creationId xmlns:a16="http://schemas.microsoft.com/office/drawing/2014/main" id="{44C53BD5-7E07-484D-AE85-C8C48B239F6E}"/>
+                  <a16:creationId xmlns:a16="http://schemas.microsoft.com/office/drawing/2014/main" xmlns="" id="{44C53BD5-7E07-484D-AE85-C8C48B239F6E}"/>
                 </a:ext>
               </a:extLst>
             </p:cNvPr>
@@ -7132,7 +7072,7 @@
             <p:cNvPr id="35" name="Arrow: Right 34">
               <a:extLst>
                 <a:ext uri="{FF2B5EF4-FFF2-40B4-BE49-F238E27FC236}">
-                  <a16:creationId xmlns:a16="http://schemas.microsoft.com/office/drawing/2014/main" id="{FDA8B83F-7B6D-48E4-9C3F-E231FD985226}"/>
+                  <a16:creationId xmlns:a16="http://schemas.microsoft.com/office/drawing/2014/main" xmlns="" id="{FDA8B83F-7B6D-48E4-9C3F-E231FD985226}"/>
                 </a:ext>
               </a:extLst>
             </p:cNvPr>
@@ -7189,7 +7129,7 @@
             <p:cNvPr id="36" name="Freeform: Shape 35">
               <a:extLst>
                 <a:ext uri="{FF2B5EF4-FFF2-40B4-BE49-F238E27FC236}">
-                  <a16:creationId xmlns:a16="http://schemas.microsoft.com/office/drawing/2014/main" id="{BDFDBD81-FB40-464A-B88D-FC851D1199F5}"/>
+                  <a16:creationId xmlns:a16="http://schemas.microsoft.com/office/drawing/2014/main" xmlns="" id="{BDFDBD81-FB40-464A-B88D-FC851D1199F5}"/>
                 </a:ext>
               </a:extLst>
             </p:cNvPr>
@@ -7374,7 +7314,7 @@
             <p:cNvPr id="37" name="Arrow: Right 36">
               <a:extLst>
                 <a:ext uri="{FF2B5EF4-FFF2-40B4-BE49-F238E27FC236}">
-                  <a16:creationId xmlns:a16="http://schemas.microsoft.com/office/drawing/2014/main" id="{9B1C1C52-F69F-4440-B1DE-3C0F549A48E0}"/>
+                  <a16:creationId xmlns:a16="http://schemas.microsoft.com/office/drawing/2014/main" xmlns="" id="{9B1C1C52-F69F-4440-B1DE-3C0F549A48E0}"/>
                 </a:ext>
               </a:extLst>
             </p:cNvPr>
@@ -7431,7 +7371,7 @@
             <p:cNvPr id="38" name="Freeform: Shape 37">
               <a:extLst>
                 <a:ext uri="{FF2B5EF4-FFF2-40B4-BE49-F238E27FC236}">
-                  <a16:creationId xmlns:a16="http://schemas.microsoft.com/office/drawing/2014/main" id="{EEC74825-30ED-4616-8DC6-6A305EAAD661}"/>
+                  <a16:creationId xmlns:a16="http://schemas.microsoft.com/office/drawing/2014/main" xmlns="" id="{EEC74825-30ED-4616-8DC6-6A305EAAD661}"/>
                 </a:ext>
               </a:extLst>
             </p:cNvPr>
@@ -7609,7 +7549,7 @@
             <p:cNvPr id="39" name="Freeform: Shape 38">
               <a:extLst>
                 <a:ext uri="{FF2B5EF4-FFF2-40B4-BE49-F238E27FC236}">
-                  <a16:creationId xmlns:a16="http://schemas.microsoft.com/office/drawing/2014/main" id="{0C660FCE-9FC8-40B5-8A8E-D950FF698E7F}"/>
+                  <a16:creationId xmlns:a16="http://schemas.microsoft.com/office/drawing/2014/main" xmlns="" id="{0C660FCE-9FC8-40B5-8A8E-D950FF698E7F}"/>
                 </a:ext>
               </a:extLst>
             </p:cNvPr>
@@ -7777,7 +7717,7 @@
             <p:cNvPr id="40" name="Arrow: Right 39">
               <a:extLst>
                 <a:ext uri="{FF2B5EF4-FFF2-40B4-BE49-F238E27FC236}">
-                  <a16:creationId xmlns:a16="http://schemas.microsoft.com/office/drawing/2014/main" id="{5193B0E6-D79F-4261-8B4D-A34BAF9C2490}"/>
+                  <a16:creationId xmlns:a16="http://schemas.microsoft.com/office/drawing/2014/main" xmlns="" id="{5193B0E6-D79F-4261-8B4D-A34BAF9C2490}"/>
                 </a:ext>
               </a:extLst>
             </p:cNvPr>
@@ -7834,7 +7774,7 @@
             <p:cNvPr id="41" name="Freeform: Shape 40">
               <a:extLst>
                 <a:ext uri="{FF2B5EF4-FFF2-40B4-BE49-F238E27FC236}">
-                  <a16:creationId xmlns:a16="http://schemas.microsoft.com/office/drawing/2014/main" id="{D2427D8B-57C5-4A0E-962F-2E6D0F48D0D6}"/>
+                  <a16:creationId xmlns:a16="http://schemas.microsoft.com/office/drawing/2014/main" xmlns="" id="{D2427D8B-57C5-4A0E-962F-2E6D0F48D0D6}"/>
                 </a:ext>
               </a:extLst>
             </p:cNvPr>
@@ -8012,7 +7952,7 @@
             <p:cNvPr id="42" name="Arrow: Right 41">
               <a:extLst>
                 <a:ext uri="{FF2B5EF4-FFF2-40B4-BE49-F238E27FC236}">
-                  <a16:creationId xmlns:a16="http://schemas.microsoft.com/office/drawing/2014/main" id="{FDBF6E59-0E7F-4725-A7F0-6D669001C510}"/>
+                  <a16:creationId xmlns:a16="http://schemas.microsoft.com/office/drawing/2014/main" xmlns="" id="{FDBF6E59-0E7F-4725-A7F0-6D669001C510}"/>
                 </a:ext>
               </a:extLst>
             </p:cNvPr>
@@ -8069,7 +8009,7 @@
             <p:cNvPr id="43" name="Freeform: Shape 42">
               <a:extLst>
                 <a:ext uri="{FF2B5EF4-FFF2-40B4-BE49-F238E27FC236}">
-                  <a16:creationId xmlns:a16="http://schemas.microsoft.com/office/drawing/2014/main" id="{69C2D6B0-3B70-4839-A4D5-32DE45F59323}"/>
+                  <a16:creationId xmlns:a16="http://schemas.microsoft.com/office/drawing/2014/main" xmlns="" id="{69C2D6B0-3B70-4839-A4D5-32DE45F59323}"/>
                 </a:ext>
               </a:extLst>
             </p:cNvPr>
@@ -8247,7 +8187,7 @@
             <p:cNvPr id="44" name="Freeform: Shape 43">
               <a:extLst>
                 <a:ext uri="{FF2B5EF4-FFF2-40B4-BE49-F238E27FC236}">
-                  <a16:creationId xmlns:a16="http://schemas.microsoft.com/office/drawing/2014/main" id="{4CABF522-64CF-41AD-911B-5D937D57F3DC}"/>
+                  <a16:creationId xmlns:a16="http://schemas.microsoft.com/office/drawing/2014/main" xmlns="" id="{4CABF522-64CF-41AD-911B-5D937D57F3DC}"/>
                 </a:ext>
               </a:extLst>
             </p:cNvPr>
@@ -8415,7 +8355,7 @@
             <p:cNvPr id="45" name="Arrow: Right 44">
               <a:extLst>
                 <a:ext uri="{FF2B5EF4-FFF2-40B4-BE49-F238E27FC236}">
-                  <a16:creationId xmlns:a16="http://schemas.microsoft.com/office/drawing/2014/main" id="{4C6B7FC5-AEB2-4600-91FD-EA3CFCCE7BF6}"/>
+                  <a16:creationId xmlns:a16="http://schemas.microsoft.com/office/drawing/2014/main" xmlns="" id="{4C6B7FC5-AEB2-4600-91FD-EA3CFCCE7BF6}"/>
                 </a:ext>
               </a:extLst>
             </p:cNvPr>
@@ -8472,7 +8412,7 @@
             <p:cNvPr id="46" name="Freeform: Shape 45">
               <a:extLst>
                 <a:ext uri="{FF2B5EF4-FFF2-40B4-BE49-F238E27FC236}">
-                  <a16:creationId xmlns:a16="http://schemas.microsoft.com/office/drawing/2014/main" id="{3661A75B-3C72-4C2C-A6B0-4DEB9033B246}"/>
+                  <a16:creationId xmlns:a16="http://schemas.microsoft.com/office/drawing/2014/main" xmlns="" id="{3661A75B-3C72-4C2C-A6B0-4DEB9033B246}"/>
                 </a:ext>
               </a:extLst>
             </p:cNvPr>
@@ -8650,7 +8590,7 @@
             <p:cNvPr id="47" name="Arrow: Right 46">
               <a:extLst>
                 <a:ext uri="{FF2B5EF4-FFF2-40B4-BE49-F238E27FC236}">
-                  <a16:creationId xmlns:a16="http://schemas.microsoft.com/office/drawing/2014/main" id="{697D6279-A88A-480A-B73A-0EBB11576748}"/>
+                  <a16:creationId xmlns:a16="http://schemas.microsoft.com/office/drawing/2014/main" xmlns="" id="{697D6279-A88A-480A-B73A-0EBB11576748}"/>
                 </a:ext>
               </a:extLst>
             </p:cNvPr>
@@ -8707,7 +8647,7 @@
             <p:cNvPr id="48" name="Freeform: Shape 47">
               <a:extLst>
                 <a:ext uri="{FF2B5EF4-FFF2-40B4-BE49-F238E27FC236}">
-                  <a16:creationId xmlns:a16="http://schemas.microsoft.com/office/drawing/2014/main" id="{D4B68E97-27C7-4BB1-9CC4-7C208D15C446}"/>
+                  <a16:creationId xmlns:a16="http://schemas.microsoft.com/office/drawing/2014/main" xmlns="" id="{D4B68E97-27C7-4BB1-9CC4-7C208D15C446}"/>
                 </a:ext>
               </a:extLst>
             </p:cNvPr>
@@ -8886,7 +8826,7 @@
           <p:cNvPr id="4" name="Rectangle 3">
             <a:extLst>
               <a:ext uri="{FF2B5EF4-FFF2-40B4-BE49-F238E27FC236}">
-                <a16:creationId xmlns:a16="http://schemas.microsoft.com/office/drawing/2014/main" id="{34C2575F-205E-46C7-9C87-1A37855E192A}"/>
+                <a16:creationId xmlns:a16="http://schemas.microsoft.com/office/drawing/2014/main" xmlns="" id="{34C2575F-205E-46C7-9C87-1A37855E192A}"/>
               </a:ext>
             </a:extLst>
           </p:cNvPr>
@@ -8919,6 +8859,66 @@
     <p:extLst>
       <p:ext uri="{BB962C8B-B14F-4D97-AF65-F5344CB8AC3E}">
         <p14:creationId xmlns:p14="http://schemas.microsoft.com/office/powerpoint/2010/main" val="250778435"/>
+      </p:ext>
+    </p:extLst>
+  </p:cSld>
+  <p:clrMapOvr>
+    <a:masterClrMapping/>
+  </p:clrMapOvr>
+</p:sld>
+</file>
+
+<file path=ppt/slides/slide5.xml><?xml version="1.0" encoding="utf-8"?>
+<p:sld xmlns:a="http://schemas.openxmlformats.org/drawingml/2006/main" xmlns:r="http://schemas.openxmlformats.org/officeDocument/2006/relationships" xmlns:p="http://schemas.openxmlformats.org/presentationml/2006/main">
+  <p:cSld>
+    <p:spTree>
+      <p:nvGrpSpPr>
+        <p:cNvPr id="1" name=""/>
+        <p:cNvGrpSpPr/>
+        <p:nvPr/>
+      </p:nvGrpSpPr>
+      <p:grpSpPr>
+        <a:xfrm>
+          <a:off x="0" y="0"/>
+          <a:ext cx="0" cy="0"/>
+          <a:chOff x="0" y="0"/>
+          <a:chExt cx="0" cy="0"/>
+        </a:xfrm>
+      </p:grpSpPr>
+      <p:sp>
+        <p:nvSpPr>
+          <p:cNvPr id="4" name="Title 3">
+            <a:extLst>
+              <a:ext uri="{FF2B5EF4-FFF2-40B4-BE49-F238E27FC236}">
+                <a16:creationId xmlns:a16="http://schemas.microsoft.com/office/drawing/2014/main" xmlns="" id="{B1E335D2-9597-4FC0-8ACA-9F196F2B7CD0}"/>
+              </a:ext>
+            </a:extLst>
+          </p:cNvPr>
+          <p:cNvSpPr>
+            <a:spLocks noGrp="1"/>
+          </p:cNvSpPr>
+          <p:nvPr>
+            <p:ph type="title"/>
+          </p:nvPr>
+        </p:nvSpPr>
+        <p:spPr/>
+        <p:txBody>
+          <a:bodyPr>
+            <a:normAutofit/>
+          </a:bodyPr>
+          <a:lstStyle/>
+          <a:p>
+            <a:r>
+              <a:rPr lang="en-US" sz="4400" dirty="0"/>
+              <a:t>Demo</a:t>
+            </a:r>
+          </a:p>
+        </p:txBody>
+      </p:sp>
+    </p:spTree>
+    <p:extLst>
+      <p:ext uri="{BB962C8B-B14F-4D97-AF65-F5344CB8AC3E}">
+        <p14:creationId xmlns:p14="http://schemas.microsoft.com/office/powerpoint/2010/main" val="1331305148"/>
       </p:ext>
     </p:extLst>
   </p:cSld>
@@ -8950,7 +8950,7 @@
           <p:cNvPr id="2" name="Title 1">
             <a:extLst>
               <a:ext uri="{FF2B5EF4-FFF2-40B4-BE49-F238E27FC236}">
-                <a16:creationId xmlns:a16="http://schemas.microsoft.com/office/drawing/2014/main" id="{15BAC696-E427-4944-B34F-4C100D7A6A88}"/>
+                <a16:creationId xmlns:a16="http://schemas.microsoft.com/office/drawing/2014/main" xmlns="" id="{15BAC696-E427-4944-B34F-4C100D7A6A88}"/>
               </a:ext>
             </a:extLst>
           </p:cNvPr>
@@ -8984,7 +8984,7 @@
           <p:cNvPr id="64" name="Group 63">
             <a:extLst>
               <a:ext uri="{FF2B5EF4-FFF2-40B4-BE49-F238E27FC236}">
-                <a16:creationId xmlns:a16="http://schemas.microsoft.com/office/drawing/2014/main" id="{4704C14E-21A1-418A-983E-18DAFF3D085A}"/>
+                <a16:creationId xmlns:a16="http://schemas.microsoft.com/office/drawing/2014/main" xmlns="" id="{4704C14E-21A1-418A-983E-18DAFF3D085A}"/>
               </a:ext>
             </a:extLst>
           </p:cNvPr>
@@ -9004,7 +9004,7 @@
             <p:cNvPr id="34" name="Freeform: Shape 33">
               <a:extLst>
                 <a:ext uri="{FF2B5EF4-FFF2-40B4-BE49-F238E27FC236}">
-                  <a16:creationId xmlns:a16="http://schemas.microsoft.com/office/drawing/2014/main" id="{44C53BD5-7E07-484D-AE85-C8C48B239F6E}"/>
+                  <a16:creationId xmlns:a16="http://schemas.microsoft.com/office/drawing/2014/main" xmlns="" id="{44C53BD5-7E07-484D-AE85-C8C48B239F6E}"/>
                 </a:ext>
               </a:extLst>
             </p:cNvPr>
@@ -9172,7 +9172,7 @@
             <p:cNvPr id="35" name="Arrow: Right 34">
               <a:extLst>
                 <a:ext uri="{FF2B5EF4-FFF2-40B4-BE49-F238E27FC236}">
-                  <a16:creationId xmlns:a16="http://schemas.microsoft.com/office/drawing/2014/main" id="{FDA8B83F-7B6D-48E4-9C3F-E231FD985226}"/>
+                  <a16:creationId xmlns:a16="http://schemas.microsoft.com/office/drawing/2014/main" xmlns="" id="{FDA8B83F-7B6D-48E4-9C3F-E231FD985226}"/>
                 </a:ext>
               </a:extLst>
             </p:cNvPr>
@@ -9229,7 +9229,7 @@
             <p:cNvPr id="36" name="Freeform: Shape 35">
               <a:extLst>
                 <a:ext uri="{FF2B5EF4-FFF2-40B4-BE49-F238E27FC236}">
-                  <a16:creationId xmlns:a16="http://schemas.microsoft.com/office/drawing/2014/main" id="{BDFDBD81-FB40-464A-B88D-FC851D1199F5}"/>
+                  <a16:creationId xmlns:a16="http://schemas.microsoft.com/office/drawing/2014/main" xmlns="" id="{BDFDBD81-FB40-464A-B88D-FC851D1199F5}"/>
                 </a:ext>
               </a:extLst>
             </p:cNvPr>
@@ -9414,7 +9414,7 @@
             <p:cNvPr id="37" name="Arrow: Right 36">
               <a:extLst>
                 <a:ext uri="{FF2B5EF4-FFF2-40B4-BE49-F238E27FC236}">
-                  <a16:creationId xmlns:a16="http://schemas.microsoft.com/office/drawing/2014/main" id="{9B1C1C52-F69F-4440-B1DE-3C0F549A48E0}"/>
+                  <a16:creationId xmlns:a16="http://schemas.microsoft.com/office/drawing/2014/main" xmlns="" id="{9B1C1C52-F69F-4440-B1DE-3C0F549A48E0}"/>
                 </a:ext>
               </a:extLst>
             </p:cNvPr>
@@ -9471,7 +9471,7 @@
             <p:cNvPr id="38" name="Freeform: Shape 37">
               <a:extLst>
                 <a:ext uri="{FF2B5EF4-FFF2-40B4-BE49-F238E27FC236}">
-                  <a16:creationId xmlns:a16="http://schemas.microsoft.com/office/drawing/2014/main" id="{EEC74825-30ED-4616-8DC6-6A305EAAD661}"/>
+                  <a16:creationId xmlns:a16="http://schemas.microsoft.com/office/drawing/2014/main" xmlns="" id="{EEC74825-30ED-4616-8DC6-6A305EAAD661}"/>
                 </a:ext>
               </a:extLst>
             </p:cNvPr>
@@ -9649,7 +9649,7 @@
             <p:cNvPr id="39" name="Freeform: Shape 38">
               <a:extLst>
                 <a:ext uri="{FF2B5EF4-FFF2-40B4-BE49-F238E27FC236}">
-                  <a16:creationId xmlns:a16="http://schemas.microsoft.com/office/drawing/2014/main" id="{0C660FCE-9FC8-40B5-8A8E-D950FF698E7F}"/>
+                  <a16:creationId xmlns:a16="http://schemas.microsoft.com/office/drawing/2014/main" xmlns="" id="{0C660FCE-9FC8-40B5-8A8E-D950FF698E7F}"/>
                 </a:ext>
               </a:extLst>
             </p:cNvPr>
@@ -9817,7 +9817,7 @@
             <p:cNvPr id="40" name="Arrow: Right 39">
               <a:extLst>
                 <a:ext uri="{FF2B5EF4-FFF2-40B4-BE49-F238E27FC236}">
-                  <a16:creationId xmlns:a16="http://schemas.microsoft.com/office/drawing/2014/main" id="{5193B0E6-D79F-4261-8B4D-A34BAF9C2490}"/>
+                  <a16:creationId xmlns:a16="http://schemas.microsoft.com/office/drawing/2014/main" xmlns="" id="{5193B0E6-D79F-4261-8B4D-A34BAF9C2490}"/>
                 </a:ext>
               </a:extLst>
             </p:cNvPr>
@@ -9874,7 +9874,7 @@
             <p:cNvPr id="41" name="Freeform: Shape 40">
               <a:extLst>
                 <a:ext uri="{FF2B5EF4-FFF2-40B4-BE49-F238E27FC236}">
-                  <a16:creationId xmlns:a16="http://schemas.microsoft.com/office/drawing/2014/main" id="{D2427D8B-57C5-4A0E-962F-2E6D0F48D0D6}"/>
+                  <a16:creationId xmlns:a16="http://schemas.microsoft.com/office/drawing/2014/main" xmlns="" id="{D2427D8B-57C5-4A0E-962F-2E6D0F48D0D6}"/>
                 </a:ext>
               </a:extLst>
             </p:cNvPr>
@@ -10052,7 +10052,7 @@
             <p:cNvPr id="42" name="Arrow: Right 41">
               <a:extLst>
                 <a:ext uri="{FF2B5EF4-FFF2-40B4-BE49-F238E27FC236}">
-                  <a16:creationId xmlns:a16="http://schemas.microsoft.com/office/drawing/2014/main" id="{FDBF6E59-0E7F-4725-A7F0-6D669001C510}"/>
+                  <a16:creationId xmlns:a16="http://schemas.microsoft.com/office/drawing/2014/main" xmlns="" id="{FDBF6E59-0E7F-4725-A7F0-6D669001C510}"/>
                 </a:ext>
               </a:extLst>
             </p:cNvPr>
@@ -10109,7 +10109,7 @@
             <p:cNvPr id="43" name="Freeform: Shape 42">
               <a:extLst>
                 <a:ext uri="{FF2B5EF4-FFF2-40B4-BE49-F238E27FC236}">
-                  <a16:creationId xmlns:a16="http://schemas.microsoft.com/office/drawing/2014/main" id="{69C2D6B0-3B70-4839-A4D5-32DE45F59323}"/>
+                  <a16:creationId xmlns:a16="http://schemas.microsoft.com/office/drawing/2014/main" xmlns="" id="{69C2D6B0-3B70-4839-A4D5-32DE45F59323}"/>
                 </a:ext>
               </a:extLst>
             </p:cNvPr>
@@ -10287,7 +10287,7 @@
             <p:cNvPr id="44" name="Freeform: Shape 43">
               <a:extLst>
                 <a:ext uri="{FF2B5EF4-FFF2-40B4-BE49-F238E27FC236}">
-                  <a16:creationId xmlns:a16="http://schemas.microsoft.com/office/drawing/2014/main" id="{4CABF522-64CF-41AD-911B-5D937D57F3DC}"/>
+                  <a16:creationId xmlns:a16="http://schemas.microsoft.com/office/drawing/2014/main" xmlns="" id="{4CABF522-64CF-41AD-911B-5D937D57F3DC}"/>
                 </a:ext>
               </a:extLst>
             </p:cNvPr>
@@ -10455,7 +10455,7 @@
             <p:cNvPr id="45" name="Arrow: Right 44">
               <a:extLst>
                 <a:ext uri="{FF2B5EF4-FFF2-40B4-BE49-F238E27FC236}">
-                  <a16:creationId xmlns:a16="http://schemas.microsoft.com/office/drawing/2014/main" id="{4C6B7FC5-AEB2-4600-91FD-EA3CFCCE7BF6}"/>
+                  <a16:creationId xmlns:a16="http://schemas.microsoft.com/office/drawing/2014/main" xmlns="" id="{4C6B7FC5-AEB2-4600-91FD-EA3CFCCE7BF6}"/>
                 </a:ext>
               </a:extLst>
             </p:cNvPr>
@@ -10512,7 +10512,7 @@
             <p:cNvPr id="46" name="Freeform: Shape 45">
               <a:extLst>
                 <a:ext uri="{FF2B5EF4-FFF2-40B4-BE49-F238E27FC236}">
-                  <a16:creationId xmlns:a16="http://schemas.microsoft.com/office/drawing/2014/main" id="{3661A75B-3C72-4C2C-A6B0-4DEB9033B246}"/>
+                  <a16:creationId xmlns:a16="http://schemas.microsoft.com/office/drawing/2014/main" xmlns="" id="{3661A75B-3C72-4C2C-A6B0-4DEB9033B246}"/>
                 </a:ext>
               </a:extLst>
             </p:cNvPr>
@@ -10690,7 +10690,7 @@
             <p:cNvPr id="47" name="Arrow: Right 46">
               <a:extLst>
                 <a:ext uri="{FF2B5EF4-FFF2-40B4-BE49-F238E27FC236}">
-                  <a16:creationId xmlns:a16="http://schemas.microsoft.com/office/drawing/2014/main" id="{697D6279-A88A-480A-B73A-0EBB11576748}"/>
+                  <a16:creationId xmlns:a16="http://schemas.microsoft.com/office/drawing/2014/main" xmlns="" id="{697D6279-A88A-480A-B73A-0EBB11576748}"/>
                 </a:ext>
               </a:extLst>
             </p:cNvPr>
@@ -10747,7 +10747,7 @@
             <p:cNvPr id="48" name="Freeform: Shape 47">
               <a:extLst>
                 <a:ext uri="{FF2B5EF4-FFF2-40B4-BE49-F238E27FC236}">
-                  <a16:creationId xmlns:a16="http://schemas.microsoft.com/office/drawing/2014/main" id="{D4B68E97-27C7-4BB1-9CC4-7C208D15C446}"/>
+                  <a16:creationId xmlns:a16="http://schemas.microsoft.com/office/drawing/2014/main" xmlns="" id="{D4B68E97-27C7-4BB1-9CC4-7C208D15C446}"/>
                 </a:ext>
               </a:extLst>
             </p:cNvPr>
@@ -10926,7 +10926,7 @@
           <p:cNvPr id="65" name="Group 64">
             <a:extLst>
               <a:ext uri="{FF2B5EF4-FFF2-40B4-BE49-F238E27FC236}">
-                <a16:creationId xmlns:a16="http://schemas.microsoft.com/office/drawing/2014/main" id="{1CFD932A-EC64-48EE-84D5-356B5E7E6D8B}"/>
+                <a16:creationId xmlns:a16="http://schemas.microsoft.com/office/drawing/2014/main" xmlns="" id="{1CFD932A-EC64-48EE-84D5-356B5E7E6D8B}"/>
               </a:ext>
             </a:extLst>
           </p:cNvPr>
@@ -10946,7 +10946,7 @@
             <p:cNvPr id="49" name="Freeform: Shape 48">
               <a:extLst>
                 <a:ext uri="{FF2B5EF4-FFF2-40B4-BE49-F238E27FC236}">
-                  <a16:creationId xmlns:a16="http://schemas.microsoft.com/office/drawing/2014/main" id="{52E25D72-6F49-4AA7-A647-204F12FCF49C}"/>
+                  <a16:creationId xmlns:a16="http://schemas.microsoft.com/office/drawing/2014/main" xmlns="" id="{52E25D72-6F49-4AA7-A647-204F12FCF49C}"/>
                 </a:ext>
               </a:extLst>
             </p:cNvPr>
@@ -11114,7 +11114,7 @@
             <p:cNvPr id="50" name="Arrow: Right 49">
               <a:extLst>
                 <a:ext uri="{FF2B5EF4-FFF2-40B4-BE49-F238E27FC236}">
-                  <a16:creationId xmlns:a16="http://schemas.microsoft.com/office/drawing/2014/main" id="{6E8F3ED5-787B-48CF-AE69-EA36EE613389}"/>
+                  <a16:creationId xmlns:a16="http://schemas.microsoft.com/office/drawing/2014/main" xmlns="" id="{6E8F3ED5-787B-48CF-AE69-EA36EE613389}"/>
                 </a:ext>
               </a:extLst>
             </p:cNvPr>
@@ -11171,7 +11171,7 @@
             <p:cNvPr id="51" name="Freeform: Shape 50">
               <a:extLst>
                 <a:ext uri="{FF2B5EF4-FFF2-40B4-BE49-F238E27FC236}">
-                  <a16:creationId xmlns:a16="http://schemas.microsoft.com/office/drawing/2014/main" id="{A515956A-FEEE-4EAC-90F9-1E1A02D229E4}"/>
+                  <a16:creationId xmlns:a16="http://schemas.microsoft.com/office/drawing/2014/main" xmlns="" id="{A515956A-FEEE-4EAC-90F9-1E1A02D229E4}"/>
                 </a:ext>
               </a:extLst>
             </p:cNvPr>
@@ -11349,7 +11349,7 @@
             <p:cNvPr id="52" name="Arrow: Right 51">
               <a:extLst>
                 <a:ext uri="{FF2B5EF4-FFF2-40B4-BE49-F238E27FC236}">
-                  <a16:creationId xmlns:a16="http://schemas.microsoft.com/office/drawing/2014/main" id="{FF72762E-B140-4655-883B-D15CA9B3F1F9}"/>
+                  <a16:creationId xmlns:a16="http://schemas.microsoft.com/office/drawing/2014/main" xmlns="" id="{FF72762E-B140-4655-883B-D15CA9B3F1F9}"/>
                 </a:ext>
               </a:extLst>
             </p:cNvPr>
@@ -11406,7 +11406,7 @@
             <p:cNvPr id="53" name="Freeform: Shape 52">
               <a:extLst>
                 <a:ext uri="{FF2B5EF4-FFF2-40B4-BE49-F238E27FC236}">
-                  <a16:creationId xmlns:a16="http://schemas.microsoft.com/office/drawing/2014/main" id="{B14A9532-F31E-4E83-8919-A2F9F2BC4575}"/>
+                  <a16:creationId xmlns:a16="http://schemas.microsoft.com/office/drawing/2014/main" xmlns="" id="{B14A9532-F31E-4E83-8919-A2F9F2BC4575}"/>
                 </a:ext>
               </a:extLst>
             </p:cNvPr>
@@ -11585,7 +11585,7 @@
           <p:cNvPr id="4" name="Rectangle 3">
             <a:extLst>
               <a:ext uri="{FF2B5EF4-FFF2-40B4-BE49-F238E27FC236}">
-                <a16:creationId xmlns:a16="http://schemas.microsoft.com/office/drawing/2014/main" id="{34C2575F-205E-46C7-9C87-1A37855E192A}"/>
+                <a16:creationId xmlns:a16="http://schemas.microsoft.com/office/drawing/2014/main" xmlns="" id="{34C2575F-205E-46C7-9C87-1A37855E192A}"/>
               </a:ext>
             </a:extLst>
           </p:cNvPr>
@@ -11625,7 +11625,7 @@
     <a:masterClrMapping/>
   </p:clrMapOvr>
   <mc:AlternateContent xmlns:mc="http://schemas.openxmlformats.org/markup-compatibility/2006">
-    <mc:Choice xmlns:p159="http://schemas.microsoft.com/office/powerpoint/2015/09/main" Requires="p159">
+    <mc:Choice xmlns:p159="http://schemas.microsoft.com/office/powerpoint/2015/09/main" xmlns="" Requires="p159">
       <p:transition xmlns:p14="http://schemas.microsoft.com/office/powerpoint/2010/main" spd="slow" p14:dur="2000">
         <p159:morph option="byObject"/>
       </p:transition>
@@ -11661,7 +11661,7 @@
           <p:cNvPr id="2" name="Title 1">
             <a:extLst>
               <a:ext uri="{FF2B5EF4-FFF2-40B4-BE49-F238E27FC236}">
-                <a16:creationId xmlns:a16="http://schemas.microsoft.com/office/drawing/2014/main" id="{15BAC696-E427-4944-B34F-4C100D7A6A88}"/>
+                <a16:creationId xmlns:a16="http://schemas.microsoft.com/office/drawing/2014/main" xmlns="" id="{15BAC696-E427-4944-B34F-4C100D7A6A88}"/>
               </a:ext>
             </a:extLst>
           </p:cNvPr>
@@ -11695,7 +11695,7 @@
           <p:cNvPr id="64" name="Group 63">
             <a:extLst>
               <a:ext uri="{FF2B5EF4-FFF2-40B4-BE49-F238E27FC236}">
-                <a16:creationId xmlns:a16="http://schemas.microsoft.com/office/drawing/2014/main" id="{4704C14E-21A1-418A-983E-18DAFF3D085A}"/>
+                <a16:creationId xmlns:a16="http://schemas.microsoft.com/office/drawing/2014/main" xmlns="" id="{4704C14E-21A1-418A-983E-18DAFF3D085A}"/>
               </a:ext>
             </a:extLst>
           </p:cNvPr>
@@ -11715,7 +11715,7 @@
             <p:cNvPr id="34" name="Freeform: Shape 33">
               <a:extLst>
                 <a:ext uri="{FF2B5EF4-FFF2-40B4-BE49-F238E27FC236}">
-                  <a16:creationId xmlns:a16="http://schemas.microsoft.com/office/drawing/2014/main" id="{44C53BD5-7E07-484D-AE85-C8C48B239F6E}"/>
+                  <a16:creationId xmlns:a16="http://schemas.microsoft.com/office/drawing/2014/main" xmlns="" id="{44C53BD5-7E07-484D-AE85-C8C48B239F6E}"/>
                 </a:ext>
               </a:extLst>
             </p:cNvPr>
@@ -11883,7 +11883,7 @@
             <p:cNvPr id="35" name="Arrow: Right 34">
               <a:extLst>
                 <a:ext uri="{FF2B5EF4-FFF2-40B4-BE49-F238E27FC236}">
-                  <a16:creationId xmlns:a16="http://schemas.microsoft.com/office/drawing/2014/main" id="{FDA8B83F-7B6D-48E4-9C3F-E231FD985226}"/>
+                  <a16:creationId xmlns:a16="http://schemas.microsoft.com/office/drawing/2014/main" xmlns="" id="{FDA8B83F-7B6D-48E4-9C3F-E231FD985226}"/>
                 </a:ext>
               </a:extLst>
             </p:cNvPr>
@@ -11940,7 +11940,7 @@
             <p:cNvPr id="36" name="Freeform: Shape 35">
               <a:extLst>
                 <a:ext uri="{FF2B5EF4-FFF2-40B4-BE49-F238E27FC236}">
-                  <a16:creationId xmlns:a16="http://schemas.microsoft.com/office/drawing/2014/main" id="{BDFDBD81-FB40-464A-B88D-FC851D1199F5}"/>
+                  <a16:creationId xmlns:a16="http://schemas.microsoft.com/office/drawing/2014/main" xmlns="" id="{BDFDBD81-FB40-464A-B88D-FC851D1199F5}"/>
                 </a:ext>
               </a:extLst>
             </p:cNvPr>
@@ -12125,7 +12125,7 @@
             <p:cNvPr id="37" name="Arrow: Right 36">
               <a:extLst>
                 <a:ext uri="{FF2B5EF4-FFF2-40B4-BE49-F238E27FC236}">
-                  <a16:creationId xmlns:a16="http://schemas.microsoft.com/office/drawing/2014/main" id="{9B1C1C52-F69F-4440-B1DE-3C0F549A48E0}"/>
+                  <a16:creationId xmlns:a16="http://schemas.microsoft.com/office/drawing/2014/main" xmlns="" id="{9B1C1C52-F69F-4440-B1DE-3C0F549A48E0}"/>
                 </a:ext>
               </a:extLst>
             </p:cNvPr>
@@ -12182,7 +12182,7 @@
             <p:cNvPr id="38" name="Freeform: Shape 37">
               <a:extLst>
                 <a:ext uri="{FF2B5EF4-FFF2-40B4-BE49-F238E27FC236}">
-                  <a16:creationId xmlns:a16="http://schemas.microsoft.com/office/drawing/2014/main" id="{EEC74825-30ED-4616-8DC6-6A305EAAD661}"/>
+                  <a16:creationId xmlns:a16="http://schemas.microsoft.com/office/drawing/2014/main" xmlns="" id="{EEC74825-30ED-4616-8DC6-6A305EAAD661}"/>
                 </a:ext>
               </a:extLst>
             </p:cNvPr>
@@ -12360,7 +12360,7 @@
             <p:cNvPr id="39" name="Freeform: Shape 38">
               <a:extLst>
                 <a:ext uri="{FF2B5EF4-FFF2-40B4-BE49-F238E27FC236}">
-                  <a16:creationId xmlns:a16="http://schemas.microsoft.com/office/drawing/2014/main" id="{0C660FCE-9FC8-40B5-8A8E-D950FF698E7F}"/>
+                  <a16:creationId xmlns:a16="http://schemas.microsoft.com/office/drawing/2014/main" xmlns="" id="{0C660FCE-9FC8-40B5-8A8E-D950FF698E7F}"/>
                 </a:ext>
               </a:extLst>
             </p:cNvPr>
@@ -12528,7 +12528,7 @@
             <p:cNvPr id="40" name="Arrow: Right 39">
               <a:extLst>
                 <a:ext uri="{FF2B5EF4-FFF2-40B4-BE49-F238E27FC236}">
-                  <a16:creationId xmlns:a16="http://schemas.microsoft.com/office/drawing/2014/main" id="{5193B0E6-D79F-4261-8B4D-A34BAF9C2490}"/>
+                  <a16:creationId xmlns:a16="http://schemas.microsoft.com/office/drawing/2014/main" xmlns="" id="{5193B0E6-D79F-4261-8B4D-A34BAF9C2490}"/>
                 </a:ext>
               </a:extLst>
             </p:cNvPr>
@@ -12585,7 +12585,7 @@
             <p:cNvPr id="41" name="Freeform: Shape 40">
               <a:extLst>
                 <a:ext uri="{FF2B5EF4-FFF2-40B4-BE49-F238E27FC236}">
-                  <a16:creationId xmlns:a16="http://schemas.microsoft.com/office/drawing/2014/main" id="{D2427D8B-57C5-4A0E-962F-2E6D0F48D0D6}"/>
+                  <a16:creationId xmlns:a16="http://schemas.microsoft.com/office/drawing/2014/main" xmlns="" id="{D2427D8B-57C5-4A0E-962F-2E6D0F48D0D6}"/>
                 </a:ext>
               </a:extLst>
             </p:cNvPr>
@@ -12763,7 +12763,7 @@
             <p:cNvPr id="42" name="Arrow: Right 41">
               <a:extLst>
                 <a:ext uri="{FF2B5EF4-FFF2-40B4-BE49-F238E27FC236}">
-                  <a16:creationId xmlns:a16="http://schemas.microsoft.com/office/drawing/2014/main" id="{FDBF6E59-0E7F-4725-A7F0-6D669001C510}"/>
+                  <a16:creationId xmlns:a16="http://schemas.microsoft.com/office/drawing/2014/main" xmlns="" id="{FDBF6E59-0E7F-4725-A7F0-6D669001C510}"/>
                 </a:ext>
               </a:extLst>
             </p:cNvPr>
@@ -12820,7 +12820,7 @@
             <p:cNvPr id="43" name="Freeform: Shape 42">
               <a:extLst>
                 <a:ext uri="{FF2B5EF4-FFF2-40B4-BE49-F238E27FC236}">
-                  <a16:creationId xmlns:a16="http://schemas.microsoft.com/office/drawing/2014/main" id="{69C2D6B0-3B70-4839-A4D5-32DE45F59323}"/>
+                  <a16:creationId xmlns:a16="http://schemas.microsoft.com/office/drawing/2014/main" xmlns="" id="{69C2D6B0-3B70-4839-A4D5-32DE45F59323}"/>
                 </a:ext>
               </a:extLst>
             </p:cNvPr>
@@ -12998,7 +12998,7 @@
             <p:cNvPr id="44" name="Freeform: Shape 43">
               <a:extLst>
                 <a:ext uri="{FF2B5EF4-FFF2-40B4-BE49-F238E27FC236}">
-                  <a16:creationId xmlns:a16="http://schemas.microsoft.com/office/drawing/2014/main" id="{4CABF522-64CF-41AD-911B-5D937D57F3DC}"/>
+                  <a16:creationId xmlns:a16="http://schemas.microsoft.com/office/drawing/2014/main" xmlns="" id="{4CABF522-64CF-41AD-911B-5D937D57F3DC}"/>
                 </a:ext>
               </a:extLst>
             </p:cNvPr>
@@ -13166,7 +13166,7 @@
             <p:cNvPr id="45" name="Arrow: Right 44">
               <a:extLst>
                 <a:ext uri="{FF2B5EF4-FFF2-40B4-BE49-F238E27FC236}">
-                  <a16:creationId xmlns:a16="http://schemas.microsoft.com/office/drawing/2014/main" id="{4C6B7FC5-AEB2-4600-91FD-EA3CFCCE7BF6}"/>
+                  <a16:creationId xmlns:a16="http://schemas.microsoft.com/office/drawing/2014/main" xmlns="" id="{4C6B7FC5-AEB2-4600-91FD-EA3CFCCE7BF6}"/>
                 </a:ext>
               </a:extLst>
             </p:cNvPr>
@@ -13223,7 +13223,7 @@
             <p:cNvPr id="46" name="Freeform: Shape 45">
               <a:extLst>
                 <a:ext uri="{FF2B5EF4-FFF2-40B4-BE49-F238E27FC236}">
-                  <a16:creationId xmlns:a16="http://schemas.microsoft.com/office/drawing/2014/main" id="{3661A75B-3C72-4C2C-A6B0-4DEB9033B246}"/>
+                  <a16:creationId xmlns:a16="http://schemas.microsoft.com/office/drawing/2014/main" xmlns="" id="{3661A75B-3C72-4C2C-A6B0-4DEB9033B246}"/>
                 </a:ext>
               </a:extLst>
             </p:cNvPr>
@@ -13401,7 +13401,7 @@
             <p:cNvPr id="47" name="Arrow: Right 46">
               <a:extLst>
                 <a:ext uri="{FF2B5EF4-FFF2-40B4-BE49-F238E27FC236}">
-                  <a16:creationId xmlns:a16="http://schemas.microsoft.com/office/drawing/2014/main" id="{697D6279-A88A-480A-B73A-0EBB11576748}"/>
+                  <a16:creationId xmlns:a16="http://schemas.microsoft.com/office/drawing/2014/main" xmlns="" id="{697D6279-A88A-480A-B73A-0EBB11576748}"/>
                 </a:ext>
               </a:extLst>
             </p:cNvPr>
@@ -13458,7 +13458,7 @@
             <p:cNvPr id="48" name="Freeform: Shape 47">
               <a:extLst>
                 <a:ext uri="{FF2B5EF4-FFF2-40B4-BE49-F238E27FC236}">
-                  <a16:creationId xmlns:a16="http://schemas.microsoft.com/office/drawing/2014/main" id="{D4B68E97-27C7-4BB1-9CC4-7C208D15C446}"/>
+                  <a16:creationId xmlns:a16="http://schemas.microsoft.com/office/drawing/2014/main" xmlns="" id="{D4B68E97-27C7-4BB1-9CC4-7C208D15C446}"/>
                 </a:ext>
               </a:extLst>
             </p:cNvPr>
@@ -13637,7 +13637,7 @@
           <p:cNvPr id="65" name="Group 64">
             <a:extLst>
               <a:ext uri="{FF2B5EF4-FFF2-40B4-BE49-F238E27FC236}">
-                <a16:creationId xmlns:a16="http://schemas.microsoft.com/office/drawing/2014/main" id="{1CFD932A-EC64-48EE-84D5-356B5E7E6D8B}"/>
+                <a16:creationId xmlns:a16="http://schemas.microsoft.com/office/drawing/2014/main" xmlns="" id="{1CFD932A-EC64-48EE-84D5-356B5E7E6D8B}"/>
               </a:ext>
             </a:extLst>
           </p:cNvPr>
@@ -13657,7 +13657,7 @@
             <p:cNvPr id="49" name="Freeform: Shape 48">
               <a:extLst>
                 <a:ext uri="{FF2B5EF4-FFF2-40B4-BE49-F238E27FC236}">
-                  <a16:creationId xmlns:a16="http://schemas.microsoft.com/office/drawing/2014/main" id="{52E25D72-6F49-4AA7-A647-204F12FCF49C}"/>
+                  <a16:creationId xmlns:a16="http://schemas.microsoft.com/office/drawing/2014/main" xmlns="" id="{52E25D72-6F49-4AA7-A647-204F12FCF49C}"/>
                 </a:ext>
               </a:extLst>
             </p:cNvPr>
@@ -13825,7 +13825,7 @@
             <p:cNvPr id="50" name="Arrow: Right 49">
               <a:extLst>
                 <a:ext uri="{FF2B5EF4-FFF2-40B4-BE49-F238E27FC236}">
-                  <a16:creationId xmlns:a16="http://schemas.microsoft.com/office/drawing/2014/main" id="{6E8F3ED5-787B-48CF-AE69-EA36EE613389}"/>
+                  <a16:creationId xmlns:a16="http://schemas.microsoft.com/office/drawing/2014/main" xmlns="" id="{6E8F3ED5-787B-48CF-AE69-EA36EE613389}"/>
                 </a:ext>
               </a:extLst>
             </p:cNvPr>
@@ -13882,7 +13882,7 @@
             <p:cNvPr id="51" name="Freeform: Shape 50">
               <a:extLst>
                 <a:ext uri="{FF2B5EF4-FFF2-40B4-BE49-F238E27FC236}">
-                  <a16:creationId xmlns:a16="http://schemas.microsoft.com/office/drawing/2014/main" id="{A515956A-FEEE-4EAC-90F9-1E1A02D229E4}"/>
+                  <a16:creationId xmlns:a16="http://schemas.microsoft.com/office/drawing/2014/main" xmlns="" id="{A515956A-FEEE-4EAC-90F9-1E1A02D229E4}"/>
                 </a:ext>
               </a:extLst>
             </p:cNvPr>
@@ -14060,7 +14060,7 @@
             <p:cNvPr id="52" name="Arrow: Right 51">
               <a:extLst>
                 <a:ext uri="{FF2B5EF4-FFF2-40B4-BE49-F238E27FC236}">
-                  <a16:creationId xmlns:a16="http://schemas.microsoft.com/office/drawing/2014/main" id="{FF72762E-B140-4655-883B-D15CA9B3F1F9}"/>
+                  <a16:creationId xmlns:a16="http://schemas.microsoft.com/office/drawing/2014/main" xmlns="" id="{FF72762E-B140-4655-883B-D15CA9B3F1F9}"/>
                 </a:ext>
               </a:extLst>
             </p:cNvPr>
@@ -14117,7 +14117,7 @@
             <p:cNvPr id="53" name="Freeform: Shape 52">
               <a:extLst>
                 <a:ext uri="{FF2B5EF4-FFF2-40B4-BE49-F238E27FC236}">
-                  <a16:creationId xmlns:a16="http://schemas.microsoft.com/office/drawing/2014/main" id="{B14A9532-F31E-4E83-8919-A2F9F2BC4575}"/>
+                  <a16:creationId xmlns:a16="http://schemas.microsoft.com/office/drawing/2014/main" xmlns="" id="{B14A9532-F31E-4E83-8919-A2F9F2BC4575}"/>
                 </a:ext>
               </a:extLst>
             </p:cNvPr>
@@ -14296,7 +14296,7 @@
           <p:cNvPr id="66" name="Group 65">
             <a:extLst>
               <a:ext uri="{FF2B5EF4-FFF2-40B4-BE49-F238E27FC236}">
-                <a16:creationId xmlns:a16="http://schemas.microsoft.com/office/drawing/2014/main" id="{7BB1CCC3-FB85-480B-8CA2-83103916CD0C}"/>
+                <a16:creationId xmlns:a16="http://schemas.microsoft.com/office/drawing/2014/main" xmlns="" id="{7BB1CCC3-FB85-480B-8CA2-83103916CD0C}"/>
               </a:ext>
             </a:extLst>
           </p:cNvPr>
@@ -14316,7 +14316,7 @@
             <p:cNvPr id="54" name="Freeform: Shape 53">
               <a:extLst>
                 <a:ext uri="{FF2B5EF4-FFF2-40B4-BE49-F238E27FC236}">
-                  <a16:creationId xmlns:a16="http://schemas.microsoft.com/office/drawing/2014/main" id="{67E6153B-58A7-478E-B012-02DA8C81A7BA}"/>
+                  <a16:creationId xmlns:a16="http://schemas.microsoft.com/office/drawing/2014/main" xmlns="" id="{67E6153B-58A7-478E-B012-02DA8C81A7BA}"/>
                 </a:ext>
               </a:extLst>
             </p:cNvPr>
@@ -14484,7 +14484,7 @@
             <p:cNvPr id="55" name="Arrow: Right 54">
               <a:extLst>
                 <a:ext uri="{FF2B5EF4-FFF2-40B4-BE49-F238E27FC236}">
-                  <a16:creationId xmlns:a16="http://schemas.microsoft.com/office/drawing/2014/main" id="{DE6B8371-20D6-4E41-B0FB-36FBC28FACAC}"/>
+                  <a16:creationId xmlns:a16="http://schemas.microsoft.com/office/drawing/2014/main" xmlns="" id="{DE6B8371-20D6-4E41-B0FB-36FBC28FACAC}"/>
                 </a:ext>
               </a:extLst>
             </p:cNvPr>
@@ -14541,7 +14541,7 @@
             <p:cNvPr id="56" name="Freeform: Shape 55">
               <a:extLst>
                 <a:ext uri="{FF2B5EF4-FFF2-40B4-BE49-F238E27FC236}">
-                  <a16:creationId xmlns:a16="http://schemas.microsoft.com/office/drawing/2014/main" id="{6DBB1B57-5FA1-4726-A0FA-FCE6AF696D5F}"/>
+                  <a16:creationId xmlns:a16="http://schemas.microsoft.com/office/drawing/2014/main" xmlns="" id="{6DBB1B57-5FA1-4726-A0FA-FCE6AF696D5F}"/>
                 </a:ext>
               </a:extLst>
             </p:cNvPr>
@@ -14719,7 +14719,7 @@
             <p:cNvPr id="57" name="Arrow: Right 56">
               <a:extLst>
                 <a:ext uri="{FF2B5EF4-FFF2-40B4-BE49-F238E27FC236}">
-                  <a16:creationId xmlns:a16="http://schemas.microsoft.com/office/drawing/2014/main" id="{D644B312-70CB-474C-90E1-C5F4D3E10C6D}"/>
+                  <a16:creationId xmlns:a16="http://schemas.microsoft.com/office/drawing/2014/main" xmlns="" id="{D644B312-70CB-474C-90E1-C5F4D3E10C6D}"/>
                 </a:ext>
               </a:extLst>
             </p:cNvPr>
@@ -14776,7 +14776,7 @@
             <p:cNvPr id="58" name="Freeform: Shape 57">
               <a:extLst>
                 <a:ext uri="{FF2B5EF4-FFF2-40B4-BE49-F238E27FC236}">
-                  <a16:creationId xmlns:a16="http://schemas.microsoft.com/office/drawing/2014/main" id="{CC1C7CCA-D833-4AE1-8A22-57D0A2826F5B}"/>
+                  <a16:creationId xmlns:a16="http://schemas.microsoft.com/office/drawing/2014/main" xmlns="" id="{CC1C7CCA-D833-4AE1-8A22-57D0A2826F5B}"/>
                 </a:ext>
               </a:extLst>
             </p:cNvPr>
@@ -14954,7 +14954,7 @@
             <p:cNvPr id="59" name="Freeform: Shape 58">
               <a:extLst>
                 <a:ext uri="{FF2B5EF4-FFF2-40B4-BE49-F238E27FC236}">
-                  <a16:creationId xmlns:a16="http://schemas.microsoft.com/office/drawing/2014/main" id="{79FFCFFE-950B-4E16-9F2F-DF4F56698853}"/>
+                  <a16:creationId xmlns:a16="http://schemas.microsoft.com/office/drawing/2014/main" xmlns="" id="{79FFCFFE-950B-4E16-9F2F-DF4F56698853}"/>
                 </a:ext>
               </a:extLst>
             </p:cNvPr>
@@ -15122,7 +15122,7 @@
             <p:cNvPr id="60" name="Arrow: Right 59">
               <a:extLst>
                 <a:ext uri="{FF2B5EF4-FFF2-40B4-BE49-F238E27FC236}">
-                  <a16:creationId xmlns:a16="http://schemas.microsoft.com/office/drawing/2014/main" id="{1AD81804-2714-4369-A33C-5EDF8FA73A4F}"/>
+                  <a16:creationId xmlns:a16="http://schemas.microsoft.com/office/drawing/2014/main" xmlns="" id="{1AD81804-2714-4369-A33C-5EDF8FA73A4F}"/>
                 </a:ext>
               </a:extLst>
             </p:cNvPr>
@@ -15179,7 +15179,7 @@
             <p:cNvPr id="61" name="Freeform: Shape 60">
               <a:extLst>
                 <a:ext uri="{FF2B5EF4-FFF2-40B4-BE49-F238E27FC236}">
-                  <a16:creationId xmlns:a16="http://schemas.microsoft.com/office/drawing/2014/main" id="{611714F9-CF72-4D47-BBA7-BE095333661B}"/>
+                  <a16:creationId xmlns:a16="http://schemas.microsoft.com/office/drawing/2014/main" xmlns="" id="{611714F9-CF72-4D47-BBA7-BE095333661B}"/>
                 </a:ext>
               </a:extLst>
             </p:cNvPr>
@@ -15357,7 +15357,7 @@
             <p:cNvPr id="62" name="Arrow: Right 61">
               <a:extLst>
                 <a:ext uri="{FF2B5EF4-FFF2-40B4-BE49-F238E27FC236}">
-                  <a16:creationId xmlns:a16="http://schemas.microsoft.com/office/drawing/2014/main" id="{8547DB7D-4B74-473F-B73F-57EB1E9C81F4}"/>
+                  <a16:creationId xmlns:a16="http://schemas.microsoft.com/office/drawing/2014/main" xmlns="" id="{8547DB7D-4B74-473F-B73F-57EB1E9C81F4}"/>
                 </a:ext>
               </a:extLst>
             </p:cNvPr>
@@ -15414,7 +15414,7 @@
             <p:cNvPr id="63" name="Freeform: Shape 62">
               <a:extLst>
                 <a:ext uri="{FF2B5EF4-FFF2-40B4-BE49-F238E27FC236}">
-                  <a16:creationId xmlns:a16="http://schemas.microsoft.com/office/drawing/2014/main" id="{476D6EA8-6A8F-42E0-A5D6-BA0CF15DC815}"/>
+                  <a16:creationId xmlns:a16="http://schemas.microsoft.com/office/drawing/2014/main" xmlns="" id="{476D6EA8-6A8F-42E0-A5D6-BA0CF15DC815}"/>
                 </a:ext>
               </a:extLst>
             </p:cNvPr>
@@ -15593,7 +15593,7 @@
           <p:cNvPr id="4" name="Rectangle 3">
             <a:extLst>
               <a:ext uri="{FF2B5EF4-FFF2-40B4-BE49-F238E27FC236}">
-                <a16:creationId xmlns:a16="http://schemas.microsoft.com/office/drawing/2014/main" id="{34C2575F-205E-46C7-9C87-1A37855E192A}"/>
+                <a16:creationId xmlns:a16="http://schemas.microsoft.com/office/drawing/2014/main" xmlns="" id="{34C2575F-205E-46C7-9C87-1A37855E192A}"/>
               </a:ext>
             </a:extLst>
           </p:cNvPr>
@@ -15633,7 +15633,7 @@
     <a:masterClrMapping/>
   </p:clrMapOvr>
   <mc:AlternateContent xmlns:mc="http://schemas.openxmlformats.org/markup-compatibility/2006">
-    <mc:Choice xmlns:p159="http://schemas.microsoft.com/office/powerpoint/2015/09/main" Requires="p159">
+    <mc:Choice xmlns:p159="http://schemas.microsoft.com/office/powerpoint/2015/09/main" xmlns="" Requires="p159">
       <p:transition xmlns:p14="http://schemas.microsoft.com/office/powerpoint/2010/main" spd="slow" p14:dur="2000">
         <p159:morph option="byObject"/>
       </p:transition>
@@ -15669,7 +15669,7 @@
           <p:cNvPr id="4" name="Title 3">
             <a:extLst>
               <a:ext uri="{FF2B5EF4-FFF2-40B4-BE49-F238E27FC236}">
-                <a16:creationId xmlns:a16="http://schemas.microsoft.com/office/drawing/2014/main" id="{50F0DD64-42E8-4B3D-AD05-5E681F4DD86C}"/>
+                <a16:creationId xmlns:a16="http://schemas.microsoft.com/office/drawing/2014/main" xmlns="" id="{50F0DD64-42E8-4B3D-AD05-5E681F4DD86C}"/>
               </a:ext>
             </a:extLst>
           </p:cNvPr>

</xml_diff>